<commit_message>
Added links to github code
</commit_message>
<xml_diff>
--- a/Taller1/Taller1.pptx
+++ b/Taller1/Taller1.pptx
@@ -4273,7 +4273,7 @@
             </a:pPr>
             <a:r>
               <a:rPr lang="en-US" sz="1800" dirty="0" smtClean="0">
-                <a:hlinkClick r:id="rId2" action="ppaction://hlinkfile"/>
+                <a:hlinkClick r:id="rId2"/>
               </a:rPr>
               <a:t>Ejemplo</a:t>
             </a:r>
@@ -4472,7 +4472,7 @@
             </a:pPr>
             <a:r>
               <a:rPr lang="en-US" sz="1800" dirty="0" smtClean="0">
-                <a:hlinkClick r:id="rId3" action="ppaction://hlinkfile"/>
+                <a:hlinkClick r:id="rId3"/>
               </a:rPr>
               <a:t>Ejemplo</a:t>
             </a:r>
@@ -5648,7 +5648,7 @@
           <a:p>
             <a:r>
               <a:rPr lang="en-US" dirty="0" smtClean="0">
-                <a:hlinkClick r:id="rId4" action="ppaction://hlinkfile"/>
+                <a:hlinkClick r:id="rId5"/>
               </a:rPr>
               <a:t>Codigo Ejemplo</a:t>
             </a:r>

</xml_diff>